<commit_message>
Aligned pictures, got until slide 4
</commit_message>
<xml_diff>
--- a/Prezentacio.pptx
+++ b/Prezentacio.pptx
@@ -8,6 +8,7 @@
     <p:sldId id="256" r:id="rId2"/>
     <p:sldId id="257" r:id="rId3"/>
     <p:sldId id="258" r:id="rId4"/>
+    <p:sldId id="259" r:id="rId5"/>
   </p:sldIdLst>
   <p:sldSz cx="9144000" cy="6858000" type="screen4x3"/>
   <p:notesSz cx="6858000" cy="9144000"/>
@@ -3786,7 +3787,7 @@
       </p:sp>
       <p:pic>
         <p:nvPicPr>
-          <p:cNvPr id="1026" name="Picture 2" descr="Imagini pentru linked list"/>
+          <p:cNvPr id="1028" name="Picture 4" descr="Imagini pentru linked list"/>
           <p:cNvPicPr>
             <a:picLocks noChangeAspect="1" noChangeArrowheads="1"/>
           </p:cNvPicPr>
@@ -3807,8 +3808,8 @@
         </p:blipFill>
         <p:spPr bwMode="auto">
           <a:xfrm>
-            <a:off x="1066800" y="2209800"/>
-            <a:ext cx="7092632" cy="2590800"/>
+            <a:off x="836066" y="2057400"/>
+            <a:ext cx="7458783" cy="2743200"/>
           </a:xfrm>
           <a:prstGeom prst="rect">
             <a:avLst/>
@@ -3872,17 +3873,108 @@
           <a:p>
             <a:pPr algn="ctr"/>
             <a:r>
-              <a:rPr lang="hu-HU" smtClean="0"/>
+              <a:rPr lang="hu-HU" dirty="0" smtClean="0"/>
               <a:t>Mi egy körkörös lista?</a:t>
             </a:r>
-            <a:endParaRPr lang="en-US"/>
-          </a:p>
-        </p:txBody>
-      </p:sp>
+            <a:endParaRPr lang="en-US" dirty="0"/>
+          </a:p>
+        </p:txBody>
+      </p:sp>
+      <p:pic>
+        <p:nvPicPr>
+          <p:cNvPr id="2050" name="Picture 2" descr="Imagini pentru circular linked list"/>
+          <p:cNvPicPr>
+            <a:picLocks noChangeAspect="1" noChangeArrowheads="1"/>
+          </p:cNvPicPr>
+          <p:nvPr/>
+        </p:nvPicPr>
+        <p:blipFill>
+          <a:blip r:embed="rId2">
+            <a:extLst>
+              <a:ext uri="{28A0092B-C50C-407E-A947-70E740481C1C}">
+                <a14:useLocalDpi xmlns:a14="http://schemas.microsoft.com/office/drawing/2010/main" val="0"/>
+              </a:ext>
+            </a:extLst>
+          </a:blip>
+          <a:srcRect/>
+          <a:stretch>
+            <a:fillRect/>
+          </a:stretch>
+        </p:blipFill>
+        <p:spPr bwMode="auto">
+          <a:xfrm>
+            <a:off x="751416" y="2476500"/>
+            <a:ext cx="7641167" cy="1905000"/>
+          </a:xfrm>
+          <a:prstGeom prst="rect">
+            <a:avLst/>
+          </a:prstGeom>
+          <a:noFill/>
+          <a:extLst>
+            <a:ext uri="{909E8E84-426E-40DD-AFC4-6F175D3DCCD1}">
+              <a14:hiddenFill xmlns:a14="http://schemas.microsoft.com/office/drawing/2010/main">
+                <a:solidFill>
+                  <a:srgbClr val="FFFFFF"/>
+                </a:solidFill>
+              </a14:hiddenFill>
+            </a:ext>
+          </a:extLst>
+        </p:spPr>
+      </p:pic>
     </p:spTree>
     <p:extLst>
       <p:ext uri="{BB962C8B-B14F-4D97-AF65-F5344CB8AC3E}">
         <p14:creationId xmlns:p14="http://schemas.microsoft.com/office/powerpoint/2010/main" val="2114319754"/>
+      </p:ext>
+    </p:extLst>
+  </p:cSld>
+  <p:clrMapOvr>
+    <a:masterClrMapping/>
+  </p:clrMapOvr>
+</p:sld>
+</file>
+
+<file path=ppt/slides/slide4.xml><?xml version="1.0" encoding="utf-8"?>
+<p:sld xmlns:a="http://schemas.openxmlformats.org/drawingml/2006/main" xmlns:r="http://schemas.openxmlformats.org/officeDocument/2006/relationships" xmlns:p="http://schemas.openxmlformats.org/presentationml/2006/main">
+  <p:cSld>
+    <p:spTree>
+      <p:nvGrpSpPr>
+        <p:cNvPr id="1" name=""/>
+        <p:cNvGrpSpPr/>
+        <p:nvPr/>
+      </p:nvGrpSpPr>
+      <p:grpSpPr>
+        <a:xfrm>
+          <a:off x="0" y="0"/>
+          <a:ext cx="0" cy="0"/>
+          <a:chOff x="0" y="0"/>
+          <a:chExt cx="0" cy="0"/>
+        </a:xfrm>
+      </p:grpSpPr>
+      <p:sp>
+        <p:nvSpPr>
+          <p:cNvPr id="2" name="Title 1"/>
+          <p:cNvSpPr>
+            <a:spLocks noGrp="1"/>
+          </p:cNvSpPr>
+          <p:nvPr>
+            <p:ph type="title"/>
+          </p:nvPr>
+        </p:nvSpPr>
+        <p:spPr/>
+        <p:txBody>
+          <a:bodyPr/>
+          <a:lstStyle/>
+          <a:p>
+            <a:pPr algn="ctr"/>
+            <a:endParaRPr lang="en-US"/>
+          </a:p>
+        </p:txBody>
+      </p:sp>
+    </p:spTree>
+    <p:extLst>
+      <p:ext uri="{BB962C8B-B14F-4D97-AF65-F5344CB8AC3E}">
+        <p14:creationId xmlns:p14="http://schemas.microsoft.com/office/powerpoint/2010/main" val="774359128"/>
       </p:ext>
     </p:extLst>
   </p:cSld>

</xml_diff>